<commit_message>
Univariate Gaussian Classifier Example Added
</commit_message>
<xml_diff>
--- a/ML_Unit4/decks/Generative Models.pptx
+++ b/ML_Unit4/decks/Generative Models.pptx
@@ -145,7 +145,7 @@
 <file path=ppt/revisionInfo.xml><?xml version="1.0" encoding="utf-8"?>
 <p1510:revInfo xmlns:a="http://schemas.openxmlformats.org/drawingml/2006/main" xmlns:r="http://schemas.openxmlformats.org/officeDocument/2006/relationships" xmlns:p1510="http://schemas.microsoft.com/office/powerpoint/2015/10/main">
   <p1510:revLst>
-    <p1510:client id="{18B6E0F2-E0EC-E94F-A80D-918920518740}" v="1318" dt="2021-11-03T10:33:17.384"/>
+    <p1510:client id="{18B6E0F2-E0EC-E94F-A80D-918920518740}" v="1343" dt="2021-11-07T06:30:31.999"/>
   </p1510:revLst>
 </p1510:revInfo>
 </file>
@@ -155,7 +155,7 @@
   <pc:docChgLst>
     <pc:chgData name="Gunnvant Saini" userId="93c4ddfd9869a0cf" providerId="LiveId" clId="{18B6E0F2-E0EC-E94F-A80D-918920518740}"/>
     <pc:docChg chg="undo custSel addSld delSld modSld sldOrd">
-      <pc:chgData name="Gunnvant Saini" userId="93c4ddfd9869a0cf" providerId="LiveId" clId="{18B6E0F2-E0EC-E94F-A80D-918920518740}" dt="2021-11-03T10:34:05.924" v="3152" actId="20577"/>
+      <pc:chgData name="Gunnvant Saini" userId="93c4ddfd9869a0cf" providerId="LiveId" clId="{18B6E0F2-E0EC-E94F-A80D-918920518740}" dt="2021-11-07T06:30:31.999" v="3177" actId="20577"/>
       <pc:docMkLst>
         <pc:docMk/>
       </pc:docMkLst>
@@ -1060,13 +1060,13 @@
         </pc:spChg>
       </pc:sldChg>
       <pc:sldChg chg="modSp add">
-        <pc:chgData name="Gunnvant Saini" userId="93c4ddfd9869a0cf" providerId="LiveId" clId="{18B6E0F2-E0EC-E94F-A80D-918920518740}" dt="2021-11-02T11:57:07.152" v="2071" actId="20577"/>
+        <pc:chgData name="Gunnvant Saini" userId="93c4ddfd9869a0cf" providerId="LiveId" clId="{18B6E0F2-E0EC-E94F-A80D-918920518740}" dt="2021-11-07T06:30:31.999" v="3177" actId="20577"/>
         <pc:sldMkLst>
           <pc:docMk/>
           <pc:sldMk cId="4288234400" sldId="277"/>
         </pc:sldMkLst>
         <pc:spChg chg="mod">
-          <ac:chgData name="Gunnvant Saini" userId="93c4ddfd9869a0cf" providerId="LiveId" clId="{18B6E0F2-E0EC-E94F-A80D-918920518740}" dt="2021-11-02T11:57:07.152" v="2071" actId="20577"/>
+          <ac:chgData name="Gunnvant Saini" userId="93c4ddfd9869a0cf" providerId="LiveId" clId="{18B6E0F2-E0EC-E94F-A80D-918920518740}" dt="2021-11-07T06:30:31.999" v="3177" actId="20577"/>
           <ac:spMkLst>
             <pc:docMk/>
             <pc:sldMk cId="4288234400" sldId="277"/>
@@ -1471,7 +1471,7 @@
           <a:p>
             <a:fld id="{C03D4A88-C790-C64F-A569-1A9AE5CBAE74}" type="datetimeFigureOut">
               <a:rPr lang="en-US" smtClean="0"/>
-              <a:t>11/2/21</a:t>
+              <a:t>11/7/21</a:t>
             </a:fld>
             <a:endParaRPr lang="en-US"/>
           </a:p>
@@ -1671,7 +1671,7 @@
           <a:p>
             <a:fld id="{C03D4A88-C790-C64F-A569-1A9AE5CBAE74}" type="datetimeFigureOut">
               <a:rPr lang="en-US" smtClean="0"/>
-              <a:t>11/2/21</a:t>
+              <a:t>11/7/21</a:t>
             </a:fld>
             <a:endParaRPr lang="en-US"/>
           </a:p>
@@ -1881,7 +1881,7 @@
           <a:p>
             <a:fld id="{C03D4A88-C790-C64F-A569-1A9AE5CBAE74}" type="datetimeFigureOut">
               <a:rPr lang="en-US" smtClean="0"/>
-              <a:t>11/2/21</a:t>
+              <a:t>11/7/21</a:t>
             </a:fld>
             <a:endParaRPr lang="en-US"/>
           </a:p>
@@ -2081,7 +2081,7 @@
           <a:p>
             <a:fld id="{C03D4A88-C790-C64F-A569-1A9AE5CBAE74}" type="datetimeFigureOut">
               <a:rPr lang="en-US" smtClean="0"/>
-              <a:t>11/2/21</a:t>
+              <a:t>11/7/21</a:t>
             </a:fld>
             <a:endParaRPr lang="en-US"/>
           </a:p>
@@ -2357,7 +2357,7 @@
           <a:p>
             <a:fld id="{C03D4A88-C790-C64F-A569-1A9AE5CBAE74}" type="datetimeFigureOut">
               <a:rPr lang="en-US" smtClean="0"/>
-              <a:t>11/2/21</a:t>
+              <a:t>11/7/21</a:t>
             </a:fld>
             <a:endParaRPr lang="en-US"/>
           </a:p>
@@ -2625,7 +2625,7 @@
           <a:p>
             <a:fld id="{C03D4A88-C790-C64F-A569-1A9AE5CBAE74}" type="datetimeFigureOut">
               <a:rPr lang="en-US" smtClean="0"/>
-              <a:t>11/2/21</a:t>
+              <a:t>11/7/21</a:t>
             </a:fld>
             <a:endParaRPr lang="en-US"/>
           </a:p>
@@ -3040,7 +3040,7 @@
           <a:p>
             <a:fld id="{C03D4A88-C790-C64F-A569-1A9AE5CBAE74}" type="datetimeFigureOut">
               <a:rPr lang="en-US" smtClean="0"/>
-              <a:t>11/2/21</a:t>
+              <a:t>11/7/21</a:t>
             </a:fld>
             <a:endParaRPr lang="en-US"/>
           </a:p>
@@ -3182,7 +3182,7 @@
           <a:p>
             <a:fld id="{C03D4A88-C790-C64F-A569-1A9AE5CBAE74}" type="datetimeFigureOut">
               <a:rPr lang="en-US" smtClean="0"/>
-              <a:t>11/2/21</a:t>
+              <a:t>11/7/21</a:t>
             </a:fld>
             <a:endParaRPr lang="en-US"/>
           </a:p>
@@ -3295,7 +3295,7 @@
           <a:p>
             <a:fld id="{C03D4A88-C790-C64F-A569-1A9AE5CBAE74}" type="datetimeFigureOut">
               <a:rPr lang="en-US" smtClean="0"/>
-              <a:t>11/2/21</a:t>
+              <a:t>11/7/21</a:t>
             </a:fld>
             <a:endParaRPr lang="en-US"/>
           </a:p>
@@ -3608,7 +3608,7 @@
           <a:p>
             <a:fld id="{C03D4A88-C790-C64F-A569-1A9AE5CBAE74}" type="datetimeFigureOut">
               <a:rPr lang="en-US" smtClean="0"/>
-              <a:t>11/2/21</a:t>
+              <a:t>11/7/21</a:t>
             </a:fld>
             <a:endParaRPr lang="en-US"/>
           </a:p>
@@ -3897,7 +3897,7 @@
           <a:p>
             <a:fld id="{C03D4A88-C790-C64F-A569-1A9AE5CBAE74}" type="datetimeFigureOut">
               <a:rPr lang="en-US" smtClean="0"/>
-              <a:t>11/2/21</a:t>
+              <a:t>11/7/21</a:t>
             </a:fld>
             <a:endParaRPr lang="en-US"/>
           </a:p>
@@ -4140,7 +4140,7 @@
           <a:p>
             <a:fld id="{C03D4A88-C790-C64F-A569-1A9AE5CBAE74}" type="datetimeFigureOut">
               <a:rPr lang="en-US" smtClean="0"/>
-              <a:t>11/2/21</a:t>
+              <a:t>11/7/21</a:t>
             </a:fld>
             <a:endParaRPr lang="en-US"/>
           </a:p>
@@ -4799,8 +4799,8 @@
           </a:p>
         </p:txBody>
       </p:sp>
-      <mc:AlternateContent xmlns:mc="http://schemas.openxmlformats.org/markup-compatibility/2006">
-        <mc:Choice xmlns:a14="http://schemas.microsoft.com/office/drawing/2010/main" Requires="a14">
+      <mc:AlternateContent xmlns:mc="http://schemas.openxmlformats.org/markup-compatibility/2006" xmlns:a14="http://schemas.microsoft.com/office/drawing/2010/main">
+        <mc:Choice Requires="a14">
           <p:sp>
             <p:nvSpPr>
               <p:cNvPr id="7" name="TextBox 6">
@@ -4829,6 +4829,7 @@
               </a:bodyPr>
               <a:lstStyle/>
               <a:p>
+                <a:pPr/>
                 <a14:m>
                   <m:oMathPara xmlns:m="http://schemas.openxmlformats.org/officeDocument/2006/math">
                     <m:oMathParaPr>
@@ -4983,7 +4984,7 @@
             </p:txBody>
           </p:sp>
         </mc:Choice>
-        <mc:Fallback>
+        <mc:Fallback xmlns="">
           <p:sp>
             <p:nvSpPr>
               <p:cNvPr id="7" name="TextBox 6">
@@ -5028,8 +5029,8 @@
           </p:sp>
         </mc:Fallback>
       </mc:AlternateContent>
-      <mc:AlternateContent xmlns:mc="http://schemas.openxmlformats.org/markup-compatibility/2006">
-        <mc:Choice xmlns:a14="http://schemas.microsoft.com/office/drawing/2010/main" Requires="a14">
+      <mc:AlternateContent xmlns:mc="http://schemas.openxmlformats.org/markup-compatibility/2006" xmlns:a14="http://schemas.microsoft.com/office/drawing/2010/main">
+        <mc:Choice Requires="a14">
           <p:sp>
             <p:nvSpPr>
               <p:cNvPr id="8" name="TextBox 7">
@@ -5058,6 +5059,7 @@
               </a:bodyPr>
               <a:lstStyle/>
               <a:p>
+                <a:pPr/>
                 <a14:m>
                   <m:oMathPara xmlns:m="http://schemas.openxmlformats.org/officeDocument/2006/math">
                     <m:oMathParaPr>
@@ -5212,7 +5214,7 @@
             </p:txBody>
           </p:sp>
         </mc:Choice>
-        <mc:Fallback>
+        <mc:Fallback xmlns="">
           <p:sp>
             <p:nvSpPr>
               <p:cNvPr id="8" name="TextBox 7">
@@ -5587,8 +5589,8 @@
           </a:p>
         </p:txBody>
       </p:sp>
-      <mc:AlternateContent xmlns:mc="http://schemas.openxmlformats.org/markup-compatibility/2006">
-        <mc:Choice xmlns:a14="http://schemas.microsoft.com/office/drawing/2010/main" Requires="a14">
+      <mc:AlternateContent xmlns:mc="http://schemas.openxmlformats.org/markup-compatibility/2006" xmlns:a14="http://schemas.microsoft.com/office/drawing/2010/main">
+        <mc:Choice Requires="a14">
           <p:sp>
             <p:nvSpPr>
               <p:cNvPr id="7" name="TextBox 6">
@@ -5617,6 +5619,7 @@
               </a:bodyPr>
               <a:lstStyle/>
               <a:p>
+                <a:pPr/>
                 <a14:m>
                   <m:oMathPara xmlns:m="http://schemas.openxmlformats.org/officeDocument/2006/math">
                     <m:oMathParaPr>
@@ -5771,7 +5774,7 @@
             </p:txBody>
           </p:sp>
         </mc:Choice>
-        <mc:Fallback>
+        <mc:Fallback xmlns="">
           <p:sp>
             <p:nvSpPr>
               <p:cNvPr id="7" name="TextBox 6">
@@ -5816,8 +5819,8 @@
           </p:sp>
         </mc:Fallback>
       </mc:AlternateContent>
-      <mc:AlternateContent xmlns:mc="http://schemas.openxmlformats.org/markup-compatibility/2006">
-        <mc:Choice xmlns:a14="http://schemas.microsoft.com/office/drawing/2010/main" Requires="a14">
+      <mc:AlternateContent xmlns:mc="http://schemas.openxmlformats.org/markup-compatibility/2006" xmlns:a14="http://schemas.microsoft.com/office/drawing/2010/main">
+        <mc:Choice Requires="a14">
           <p:sp>
             <p:nvSpPr>
               <p:cNvPr id="8" name="TextBox 7">
@@ -5846,6 +5849,7 @@
               </a:bodyPr>
               <a:lstStyle/>
               <a:p>
+                <a:pPr/>
                 <a14:m>
                   <m:oMathPara xmlns:m="http://schemas.openxmlformats.org/officeDocument/2006/math">
                     <m:oMathParaPr>
@@ -6000,7 +6004,7 @@
             </p:txBody>
           </p:sp>
         </mc:Choice>
-        <mc:Fallback>
+        <mc:Fallback xmlns="">
           <p:sp>
             <p:nvSpPr>
               <p:cNvPr id="8" name="TextBox 7">
@@ -6410,8 +6414,8 @@
           </a:p>
         </p:txBody>
       </p:sp>
-      <mc:AlternateContent xmlns:mc="http://schemas.openxmlformats.org/markup-compatibility/2006">
-        <mc:Choice xmlns:a14="http://schemas.microsoft.com/office/drawing/2010/main" Requires="a14">
+      <mc:AlternateContent xmlns:mc="http://schemas.openxmlformats.org/markup-compatibility/2006" xmlns:a14="http://schemas.microsoft.com/office/drawing/2010/main">
+        <mc:Choice Requires="a14">
           <p:sp>
             <p:nvSpPr>
               <p:cNvPr id="7" name="TextBox 6">
@@ -6440,6 +6444,7 @@
               </a:bodyPr>
               <a:lstStyle/>
               <a:p>
+                <a:pPr/>
                 <a14:m>
                   <m:oMathPara xmlns:m="http://schemas.openxmlformats.org/officeDocument/2006/math">
                     <m:oMathParaPr>
@@ -6594,7 +6599,7 @@
             </p:txBody>
           </p:sp>
         </mc:Choice>
-        <mc:Fallback>
+        <mc:Fallback xmlns="">
           <p:sp>
             <p:nvSpPr>
               <p:cNvPr id="7" name="TextBox 6">
@@ -6639,8 +6644,8 @@
           </p:sp>
         </mc:Fallback>
       </mc:AlternateContent>
-      <mc:AlternateContent xmlns:mc="http://schemas.openxmlformats.org/markup-compatibility/2006">
-        <mc:Choice xmlns:a14="http://schemas.microsoft.com/office/drawing/2010/main" Requires="a14">
+      <mc:AlternateContent xmlns:mc="http://schemas.openxmlformats.org/markup-compatibility/2006" xmlns:a14="http://schemas.microsoft.com/office/drawing/2010/main">
+        <mc:Choice Requires="a14">
           <p:sp>
             <p:nvSpPr>
               <p:cNvPr id="8" name="TextBox 7">
@@ -6669,6 +6674,7 @@
               </a:bodyPr>
               <a:lstStyle/>
               <a:p>
+                <a:pPr/>
                 <a14:m>
                   <m:oMathPara xmlns:m="http://schemas.openxmlformats.org/officeDocument/2006/math">
                     <m:oMathParaPr>
@@ -6823,7 +6829,7 @@
             </p:txBody>
           </p:sp>
         </mc:Choice>
-        <mc:Fallback>
+        <mc:Fallback xmlns="">
           <p:sp>
             <p:nvSpPr>
               <p:cNvPr id="8" name="TextBox 7">
@@ -7233,8 +7239,8 @@
           </a:p>
         </p:txBody>
       </p:sp>
-      <mc:AlternateContent xmlns:mc="http://schemas.openxmlformats.org/markup-compatibility/2006">
-        <mc:Choice xmlns:a14="http://schemas.microsoft.com/office/drawing/2010/main" Requires="a14">
+      <mc:AlternateContent xmlns:mc="http://schemas.openxmlformats.org/markup-compatibility/2006" xmlns:a14="http://schemas.microsoft.com/office/drawing/2010/main">
+        <mc:Choice Requires="a14">
           <p:sp>
             <p:nvSpPr>
               <p:cNvPr id="7" name="TextBox 6">
@@ -7263,6 +7269,7 @@
               </a:bodyPr>
               <a:lstStyle/>
               <a:p>
+                <a:pPr/>
                 <a14:m>
                   <m:oMathPara xmlns:m="http://schemas.openxmlformats.org/officeDocument/2006/math">
                     <m:oMathParaPr>
@@ -7417,7 +7424,7 @@
             </p:txBody>
           </p:sp>
         </mc:Choice>
-        <mc:Fallback>
+        <mc:Fallback xmlns="">
           <p:sp>
             <p:nvSpPr>
               <p:cNvPr id="7" name="TextBox 6">
@@ -7462,8 +7469,8 @@
           </p:sp>
         </mc:Fallback>
       </mc:AlternateContent>
-      <mc:AlternateContent xmlns:mc="http://schemas.openxmlformats.org/markup-compatibility/2006">
-        <mc:Choice xmlns:a14="http://schemas.microsoft.com/office/drawing/2010/main" Requires="a14">
+      <mc:AlternateContent xmlns:mc="http://schemas.openxmlformats.org/markup-compatibility/2006" xmlns:a14="http://schemas.microsoft.com/office/drawing/2010/main">
+        <mc:Choice Requires="a14">
           <p:sp>
             <p:nvSpPr>
               <p:cNvPr id="8" name="TextBox 7">
@@ -7492,6 +7499,7 @@
               </a:bodyPr>
               <a:lstStyle/>
               <a:p>
+                <a:pPr/>
                 <a14:m>
                   <m:oMathPara xmlns:m="http://schemas.openxmlformats.org/officeDocument/2006/math">
                     <m:oMathParaPr>
@@ -7646,7 +7654,7 @@
             </p:txBody>
           </p:sp>
         </mc:Choice>
-        <mc:Fallback>
+        <mc:Fallback xmlns="">
           <p:sp>
             <p:nvSpPr>
               <p:cNvPr id="8" name="TextBox 7">
@@ -7874,8 +7882,8 @@
           </a:p>
         </p:txBody>
       </p:sp>
-      <mc:AlternateContent xmlns:mc="http://schemas.openxmlformats.org/markup-compatibility/2006">
-        <mc:Choice xmlns:a14="http://schemas.microsoft.com/office/drawing/2010/main" Requires="a14">
+      <mc:AlternateContent xmlns:mc="http://schemas.openxmlformats.org/markup-compatibility/2006" xmlns:a14="http://schemas.microsoft.com/office/drawing/2010/main">
+        <mc:Choice Requires="a14">
           <p:sp>
             <p:nvSpPr>
               <p:cNvPr id="13" name="TextBox 12">
@@ -7904,6 +7912,7 @@
               </a:bodyPr>
               <a:lstStyle/>
               <a:p>
+                <a:pPr/>
                 <a14:m>
                   <m:oMathPara xmlns:m="http://schemas.openxmlformats.org/officeDocument/2006/math">
                     <m:oMathParaPr>
@@ -8029,7 +8038,7 @@
             </p:txBody>
           </p:sp>
         </mc:Choice>
-        <mc:Fallback>
+        <mc:Fallback xmlns="">
           <p:sp>
             <p:nvSpPr>
               <p:cNvPr id="13" name="TextBox 12">
@@ -8074,8 +8083,8 @@
           </p:sp>
         </mc:Fallback>
       </mc:AlternateContent>
-      <mc:AlternateContent xmlns:mc="http://schemas.openxmlformats.org/markup-compatibility/2006">
-        <mc:Choice xmlns:a14="http://schemas.microsoft.com/office/drawing/2010/main" Requires="a14">
+      <mc:AlternateContent xmlns:mc="http://schemas.openxmlformats.org/markup-compatibility/2006" xmlns:a14="http://schemas.microsoft.com/office/drawing/2010/main">
+        <mc:Choice Requires="a14">
           <p:sp>
             <p:nvSpPr>
               <p:cNvPr id="14" name="TextBox 13">
@@ -8104,6 +8113,7 @@
               </a:bodyPr>
               <a:lstStyle/>
               <a:p>
+                <a:pPr/>
                 <a14:m>
                   <m:oMathPara xmlns:m="http://schemas.openxmlformats.org/officeDocument/2006/math">
                     <m:oMathParaPr>
@@ -8267,7 +8277,7 @@
             </p:txBody>
           </p:sp>
         </mc:Choice>
-        <mc:Fallback>
+        <mc:Fallback xmlns="">
           <p:sp>
             <p:nvSpPr>
               <p:cNvPr id="14" name="TextBox 13">
@@ -8494,8 +8504,8 @@
           </a:p>
         </p:txBody>
       </p:sp>
-      <mc:AlternateContent xmlns:mc="http://schemas.openxmlformats.org/markup-compatibility/2006">
-        <mc:Choice xmlns:a14="http://schemas.microsoft.com/office/drawing/2010/main" Requires="a14">
+      <mc:AlternateContent xmlns:mc="http://schemas.openxmlformats.org/markup-compatibility/2006" xmlns:a14="http://schemas.microsoft.com/office/drawing/2010/main">
+        <mc:Choice Requires="a14">
           <p:sp>
             <p:nvSpPr>
               <p:cNvPr id="7" name="TextBox 6">
@@ -8524,6 +8534,7 @@
               </a:bodyPr>
               <a:lstStyle/>
               <a:p>
+                <a:pPr/>
                 <a14:m>
                   <m:oMathPara xmlns:m="http://schemas.openxmlformats.org/officeDocument/2006/math">
                     <m:oMathParaPr>
@@ -8678,7 +8689,7 @@
             </p:txBody>
           </p:sp>
         </mc:Choice>
-        <mc:Fallback>
+        <mc:Fallback xmlns="">
           <p:sp>
             <p:nvSpPr>
               <p:cNvPr id="7" name="TextBox 6">
@@ -8723,8 +8734,8 @@
           </p:sp>
         </mc:Fallback>
       </mc:AlternateContent>
-      <mc:AlternateContent xmlns:mc="http://schemas.openxmlformats.org/markup-compatibility/2006">
-        <mc:Choice xmlns:a14="http://schemas.microsoft.com/office/drawing/2010/main" Requires="a14">
+      <mc:AlternateContent xmlns:mc="http://schemas.openxmlformats.org/markup-compatibility/2006" xmlns:a14="http://schemas.microsoft.com/office/drawing/2010/main">
+        <mc:Choice Requires="a14">
           <p:sp>
             <p:nvSpPr>
               <p:cNvPr id="8" name="TextBox 7">
@@ -8753,6 +8764,7 @@
               </a:bodyPr>
               <a:lstStyle/>
               <a:p>
+                <a:pPr/>
                 <a14:m>
                   <m:oMathPara xmlns:m="http://schemas.openxmlformats.org/officeDocument/2006/math">
                     <m:oMathParaPr>
@@ -8907,7 +8919,7 @@
             </p:txBody>
           </p:sp>
         </mc:Choice>
-        <mc:Fallback>
+        <mc:Fallback xmlns="">
           <p:sp>
             <p:nvSpPr>
               <p:cNvPr id="8" name="TextBox 7">
@@ -9237,8 +9249,8 @@
           </a:p>
         </p:txBody>
       </p:sp>
-      <mc:AlternateContent xmlns:mc="http://schemas.openxmlformats.org/markup-compatibility/2006">
-        <mc:Choice xmlns:a14="http://schemas.microsoft.com/office/drawing/2010/main" Requires="a14">
+      <mc:AlternateContent xmlns:mc="http://schemas.openxmlformats.org/markup-compatibility/2006" xmlns:a14="http://schemas.microsoft.com/office/drawing/2010/main">
+        <mc:Choice Requires="a14">
           <p:sp>
             <p:nvSpPr>
               <p:cNvPr id="4" name="TextBox 3">
@@ -9280,6 +9292,7 @@
               </a:bodyPr>
               <a:lstStyle/>
               <a:p>
+                <a:pPr/>
                 <a14:m>
                   <m:oMathPara xmlns:m="http://schemas.openxmlformats.org/officeDocument/2006/math">
                     <m:oMathParaPr>
@@ -9350,7 +9363,7 @@
             </p:txBody>
           </p:sp>
         </mc:Choice>
-        <mc:Fallback>
+        <mc:Fallback xmlns="">
           <p:sp>
             <p:nvSpPr>
               <p:cNvPr id="4" name="TextBox 3">
@@ -9430,8 +9443,8 @@
           </a:p>
         </p:txBody>
       </p:sp>
-      <mc:AlternateContent xmlns:mc="http://schemas.openxmlformats.org/markup-compatibility/2006">
-        <mc:Choice xmlns:a14="http://schemas.microsoft.com/office/drawing/2010/main" Requires="a14">
+      <mc:AlternateContent xmlns:mc="http://schemas.openxmlformats.org/markup-compatibility/2006" xmlns:a14="http://schemas.microsoft.com/office/drawing/2010/main">
+        <mc:Choice Requires="a14">
           <p:sp>
             <p:nvSpPr>
               <p:cNvPr id="7" name="TextBox 6">
@@ -9460,6 +9473,7 @@
               </a:bodyPr>
               <a:lstStyle/>
               <a:p>
+                <a:pPr/>
                 <a14:m>
                   <m:oMathPara xmlns:m="http://schemas.openxmlformats.org/officeDocument/2006/math">
                     <m:oMathParaPr>
@@ -9626,7 +9640,7 @@
             </p:txBody>
           </p:sp>
         </mc:Choice>
-        <mc:Fallback>
+        <mc:Fallback xmlns="">
           <p:sp>
             <p:nvSpPr>
               <p:cNvPr id="7" name="TextBox 6">
@@ -9671,8 +9685,8 @@
           </p:sp>
         </mc:Fallback>
       </mc:AlternateContent>
-      <mc:AlternateContent xmlns:mc="http://schemas.openxmlformats.org/markup-compatibility/2006">
-        <mc:Choice xmlns:a14="http://schemas.microsoft.com/office/drawing/2010/main" Requires="a14">
+      <mc:AlternateContent xmlns:mc="http://schemas.openxmlformats.org/markup-compatibility/2006" xmlns:a14="http://schemas.microsoft.com/office/drawing/2010/main">
+        <mc:Choice Requires="a14">
           <p:sp>
             <p:nvSpPr>
               <p:cNvPr id="8" name="TextBox 7">
@@ -9701,6 +9715,7 @@
               </a:bodyPr>
               <a:lstStyle/>
               <a:p>
+                <a:pPr/>
                 <a14:m>
                   <m:oMathPara xmlns:m="http://schemas.openxmlformats.org/officeDocument/2006/math">
                     <m:oMathParaPr>
@@ -9882,7 +9897,7 @@
             </p:txBody>
           </p:sp>
         </mc:Choice>
-        <mc:Fallback>
+        <mc:Fallback xmlns="">
           <p:sp>
             <p:nvSpPr>
               <p:cNvPr id="8" name="TextBox 7">
@@ -10254,8 +10269,8 @@
           </a:p>
         </p:txBody>
       </p:sp>
-      <mc:AlternateContent xmlns:mc="http://schemas.openxmlformats.org/markup-compatibility/2006">
-        <mc:Choice xmlns:a14="http://schemas.microsoft.com/office/drawing/2010/main" Requires="a14">
+      <mc:AlternateContent xmlns:mc="http://schemas.openxmlformats.org/markup-compatibility/2006" xmlns:a14="http://schemas.microsoft.com/office/drawing/2010/main">
+        <mc:Choice Requires="a14">
           <p:sp>
             <p:nvSpPr>
               <p:cNvPr id="4" name="TextBox 3">
@@ -10297,6 +10312,7 @@
               </a:bodyPr>
               <a:lstStyle/>
               <a:p>
+                <a:pPr/>
                 <a14:m>
                   <m:oMathPara xmlns:m="http://schemas.openxmlformats.org/officeDocument/2006/math">
                     <m:oMathParaPr>
@@ -10367,7 +10383,7 @@
             </p:txBody>
           </p:sp>
         </mc:Choice>
-        <mc:Fallback>
+        <mc:Fallback xmlns="">
           <p:sp>
             <p:nvSpPr>
               <p:cNvPr id="4" name="TextBox 3">
@@ -10623,8 +10639,8 @@
           </a:p>
         </p:txBody>
       </p:sp>
-      <mc:AlternateContent xmlns:mc="http://schemas.openxmlformats.org/markup-compatibility/2006">
-        <mc:Choice xmlns:a14="http://schemas.microsoft.com/office/drawing/2010/main" Requires="a14">
+      <mc:AlternateContent xmlns:mc="http://schemas.openxmlformats.org/markup-compatibility/2006" xmlns:a14="http://schemas.microsoft.com/office/drawing/2010/main">
+        <mc:Choice Requires="a14">
           <p:sp>
             <p:nvSpPr>
               <p:cNvPr id="4" name="TextBox 3">
@@ -10666,6 +10682,7 @@
               </a:bodyPr>
               <a:lstStyle/>
               <a:p>
+                <a:pPr/>
                 <a14:m>
                   <m:oMathPara xmlns:m="http://schemas.openxmlformats.org/officeDocument/2006/math">
                     <m:oMathParaPr>
@@ -10736,7 +10753,7 @@
             </p:txBody>
           </p:sp>
         </mc:Choice>
-        <mc:Fallback>
+        <mc:Fallback xmlns="">
           <p:sp>
             <p:nvSpPr>
               <p:cNvPr id="4" name="TextBox 3">
@@ -10934,8 +10951,8 @@
           </a:p>
         </p:txBody>
       </p:sp>
-      <mc:AlternateContent xmlns:mc="http://schemas.openxmlformats.org/markup-compatibility/2006">
-        <mc:Choice xmlns:a14="http://schemas.microsoft.com/office/drawing/2010/main" Requires="a14">
+      <mc:AlternateContent xmlns:mc="http://schemas.openxmlformats.org/markup-compatibility/2006" xmlns:a14="http://schemas.microsoft.com/office/drawing/2010/main">
+        <mc:Choice Requires="a14">
           <p:sp>
             <p:nvSpPr>
               <p:cNvPr id="8" name="TextBox 7">
@@ -10964,6 +10981,7 @@
               </a:bodyPr>
               <a:lstStyle/>
               <a:p>
+                <a:pPr/>
                 <a14:m>
                   <m:oMathPara xmlns:m="http://schemas.openxmlformats.org/officeDocument/2006/math">
                     <m:oMathParaPr>
@@ -11130,7 +11148,7 @@
             </p:txBody>
           </p:sp>
         </mc:Choice>
-        <mc:Fallback>
+        <mc:Fallback xmlns="">
           <p:sp>
             <p:nvSpPr>
               <p:cNvPr id="8" name="TextBox 7">
@@ -11307,8 +11325,8 @@
           </a:p>
         </p:txBody>
       </p:sp>
-      <mc:AlternateContent xmlns:mc="http://schemas.openxmlformats.org/markup-compatibility/2006">
-        <mc:Choice xmlns:a14="http://schemas.microsoft.com/office/drawing/2010/main" Requires="a14">
+      <mc:AlternateContent xmlns:mc="http://schemas.openxmlformats.org/markup-compatibility/2006" xmlns:a14="http://schemas.microsoft.com/office/drawing/2010/main">
+        <mc:Choice Requires="a14">
           <p:sp>
             <p:nvSpPr>
               <p:cNvPr id="4" name="TextBox 3">
@@ -11350,6 +11368,7 @@
               </a:bodyPr>
               <a:lstStyle/>
               <a:p>
+                <a:pPr/>
                 <a14:m>
                   <m:oMathPara xmlns:m="http://schemas.openxmlformats.org/officeDocument/2006/math">
                     <m:oMathParaPr>
@@ -11420,7 +11439,7 @@
             </p:txBody>
           </p:sp>
         </mc:Choice>
-        <mc:Fallback>
+        <mc:Fallback xmlns="">
           <p:sp>
             <p:nvSpPr>
               <p:cNvPr id="4" name="TextBox 3">
@@ -11618,8 +11637,8 @@
           </a:p>
         </p:txBody>
       </p:sp>
-      <mc:AlternateContent xmlns:mc="http://schemas.openxmlformats.org/markup-compatibility/2006">
-        <mc:Choice xmlns:a14="http://schemas.microsoft.com/office/drawing/2010/main" Requires="a14">
+      <mc:AlternateContent xmlns:mc="http://schemas.openxmlformats.org/markup-compatibility/2006" xmlns:a14="http://schemas.microsoft.com/office/drawing/2010/main">
+        <mc:Choice Requires="a14">
           <p:sp>
             <p:nvSpPr>
               <p:cNvPr id="8" name="TextBox 7">
@@ -11648,6 +11667,7 @@
               </a:bodyPr>
               <a:lstStyle/>
               <a:p>
+                <a:pPr/>
                 <a14:m>
                   <m:oMathPara xmlns:m="http://schemas.openxmlformats.org/officeDocument/2006/math">
                     <m:oMathParaPr>
@@ -11814,7 +11834,7 @@
             </p:txBody>
           </p:sp>
         </mc:Choice>
-        <mc:Fallback>
+        <mc:Fallback xmlns="">
           <p:sp>
             <p:nvSpPr>
               <p:cNvPr id="8" name="TextBox 7">
@@ -12187,8 +12207,8 @@
           </a:p>
         </p:txBody>
       </p:sp>
-      <mc:AlternateContent xmlns:mc="http://schemas.openxmlformats.org/markup-compatibility/2006">
-        <mc:Choice xmlns:a14="http://schemas.microsoft.com/office/drawing/2010/main" Requires="a14">
+      <mc:AlternateContent xmlns:mc="http://schemas.openxmlformats.org/markup-compatibility/2006" xmlns:a14="http://schemas.microsoft.com/office/drawing/2010/main">
+        <mc:Choice Requires="a14">
           <p:sp>
             <p:nvSpPr>
               <p:cNvPr id="4" name="TextBox 3">
@@ -12230,6 +12250,7 @@
               </a:bodyPr>
               <a:lstStyle/>
               <a:p>
+                <a:pPr/>
                 <a14:m>
                   <m:oMathPara xmlns:m="http://schemas.openxmlformats.org/officeDocument/2006/math">
                     <m:oMathParaPr>
@@ -12300,7 +12321,7 @@
             </p:txBody>
           </p:sp>
         </mc:Choice>
-        <mc:Fallback>
+        <mc:Fallback xmlns="">
           <p:sp>
             <p:nvSpPr>
               <p:cNvPr id="4" name="TextBox 3">
@@ -12498,8 +12519,8 @@
           </a:p>
         </p:txBody>
       </p:sp>
-      <mc:AlternateContent xmlns:mc="http://schemas.openxmlformats.org/markup-compatibility/2006">
-        <mc:Choice xmlns:a14="http://schemas.microsoft.com/office/drawing/2010/main" Requires="a14">
+      <mc:AlternateContent xmlns:mc="http://schemas.openxmlformats.org/markup-compatibility/2006" xmlns:a14="http://schemas.microsoft.com/office/drawing/2010/main">
+        <mc:Choice Requires="a14">
           <p:sp>
             <p:nvSpPr>
               <p:cNvPr id="8" name="TextBox 7">
@@ -12528,6 +12549,7 @@
               </a:bodyPr>
               <a:lstStyle/>
               <a:p>
+                <a:pPr/>
                 <a14:m>
                   <m:oMathPara xmlns:m="http://schemas.openxmlformats.org/officeDocument/2006/math">
                     <m:oMathParaPr>
@@ -12694,7 +12716,7 @@
             </p:txBody>
           </p:sp>
         </mc:Choice>
-        <mc:Fallback>
+        <mc:Fallback xmlns="">
           <p:sp>
             <p:nvSpPr>
               <p:cNvPr id="8" name="TextBox 7">
@@ -13044,8 +13066,8 @@
           </a:p>
         </p:txBody>
       </p:sp>
-      <mc:AlternateContent xmlns:mc="http://schemas.openxmlformats.org/markup-compatibility/2006">
-        <mc:Choice xmlns:a14="http://schemas.microsoft.com/office/drawing/2010/main" Requires="a14">
+      <mc:AlternateContent xmlns:mc="http://schemas.openxmlformats.org/markup-compatibility/2006" xmlns:a14="http://schemas.microsoft.com/office/drawing/2010/main">
+        <mc:Choice Requires="a14">
           <p:sp>
             <p:nvSpPr>
               <p:cNvPr id="3" name="TextBox 2">
@@ -13074,6 +13096,7 @@
               </a:bodyPr>
               <a:lstStyle/>
               <a:p>
+                <a:pPr/>
                 <a14:m>
                   <m:oMathPara xmlns:m="http://schemas.openxmlformats.org/officeDocument/2006/math">
                     <m:oMathParaPr>
@@ -13259,7 +13282,7 @@
             </p:txBody>
           </p:sp>
         </mc:Choice>
-        <mc:Fallback>
+        <mc:Fallback xmlns="">
           <p:sp>
             <p:nvSpPr>
               <p:cNvPr id="3" name="TextBox 2">
@@ -13504,8 +13527,8 @@
           </a:p>
         </p:txBody>
       </p:sp>
-      <mc:AlternateContent xmlns:mc="http://schemas.openxmlformats.org/markup-compatibility/2006">
-        <mc:Choice xmlns:a14="http://schemas.microsoft.com/office/drawing/2010/main" Requires="a14">
+      <mc:AlternateContent xmlns:mc="http://schemas.openxmlformats.org/markup-compatibility/2006" xmlns:a14="http://schemas.microsoft.com/office/drawing/2010/main">
+        <mc:Choice Requires="a14">
           <p:sp>
             <p:nvSpPr>
               <p:cNvPr id="4" name="TextBox 3">
@@ -13547,6 +13570,7 @@
               </a:bodyPr>
               <a:lstStyle/>
               <a:p>
+                <a:pPr/>
                 <a14:m>
                   <m:oMathPara xmlns:m="http://schemas.openxmlformats.org/officeDocument/2006/math">
                     <m:oMathParaPr>
@@ -13617,7 +13641,7 @@
             </p:txBody>
           </p:sp>
         </mc:Choice>
-        <mc:Fallback>
+        <mc:Fallback xmlns="">
           <p:sp>
             <p:nvSpPr>
               <p:cNvPr id="4" name="TextBox 3">
@@ -13815,8 +13839,8 @@
           </a:p>
         </p:txBody>
       </p:sp>
-      <mc:AlternateContent xmlns:mc="http://schemas.openxmlformats.org/markup-compatibility/2006">
-        <mc:Choice xmlns:a14="http://schemas.microsoft.com/office/drawing/2010/main" Requires="a14">
+      <mc:AlternateContent xmlns:mc="http://schemas.openxmlformats.org/markup-compatibility/2006" xmlns:a14="http://schemas.microsoft.com/office/drawing/2010/main">
+        <mc:Choice Requires="a14">
           <p:sp>
             <p:nvSpPr>
               <p:cNvPr id="8" name="TextBox 7">
@@ -13845,6 +13869,7 @@
               </a:bodyPr>
               <a:lstStyle/>
               <a:p>
+                <a:pPr/>
                 <a14:m>
                   <m:oMathPara xmlns:m="http://schemas.openxmlformats.org/officeDocument/2006/math">
                     <m:oMathParaPr>
@@ -14011,7 +14036,7 @@
             </p:txBody>
           </p:sp>
         </mc:Choice>
-        <mc:Fallback>
+        <mc:Fallback xmlns="">
           <p:sp>
             <p:nvSpPr>
               <p:cNvPr id="8" name="TextBox 7">
@@ -14378,7 +14403,7 @@
             <p:spPr>
               <a:xfrm>
                 <a:off x="4057290" y="5483104"/>
-                <a:ext cx="4604658" cy="331822"/>
+                <a:ext cx="4152034" cy="331822"/>
               </a:xfrm>
               <a:prstGeom prst="rect">
                 <a:avLst/>
@@ -14391,6 +14416,7 @@
               </a:bodyPr>
               <a:lstStyle/>
               <a:p>
+                <a:pPr/>
                 <a14:m>
                   <m:oMathPara xmlns:m="http://schemas.openxmlformats.org/officeDocument/2006/math">
                     <m:oMathParaPr>
@@ -14448,19 +14474,7 @@
                         <a:rPr lang="en-US" b="0" i="1" smtClean="0">
                           <a:latin typeface="Cambria Math" panose="02040503050406030204" pitchFamily="18" charset="0"/>
                         </a:rPr>
-                        <m:t>=</m:t>
-                      </m:r>
-                      <m:r>
-                        <a:rPr lang="en-US" b="0" i="1" smtClean="0">
-                          <a:latin typeface="Cambria Math" panose="02040503050406030204" pitchFamily="18" charset="0"/>
-                        </a:rPr>
-                        <m:t>𝑚𝑎𝑥</m:t>
-                      </m:r>
-                      <m:r>
-                        <a:rPr lang="en-US" b="0" i="1" smtClean="0">
-                          <a:latin typeface="Cambria Math" panose="02040503050406030204" pitchFamily="18" charset="0"/>
-                        </a:rPr>
-                        <m:t> ∏</m:t>
+                        <m:t>= ∏</m:t>
                       </m:r>
                       <m:sSubSup>
                         <m:sSubSupPr>
@@ -14618,7 +14632,7 @@
             <p:spPr>
               <a:xfrm>
                 <a:off x="4057290" y="5483104"/>
-                <a:ext cx="4604658" cy="331822"/>
+                <a:ext cx="4152034" cy="331822"/>
               </a:xfrm>
               <a:prstGeom prst="rect">
                 <a:avLst/>
@@ -14626,7 +14640,7 @@
               <a:blipFill>
                 <a:blip r:embed="rId4"/>
                 <a:stretch>
-                  <a:fillRect l="-275" r="-1099" b="-33333"/>
+                  <a:fillRect l="-305" r="-1524" b="-33333"/>
                 </a:stretch>
               </a:blipFill>
             </p:spPr>
@@ -14703,8 +14717,8 @@
           </a:p>
         </p:txBody>
       </p:sp>
-      <mc:AlternateContent xmlns:mc="http://schemas.openxmlformats.org/markup-compatibility/2006">
-        <mc:Choice xmlns:a14="http://schemas.microsoft.com/office/drawing/2010/main" Requires="a14">
+      <mc:AlternateContent xmlns:mc="http://schemas.openxmlformats.org/markup-compatibility/2006" xmlns:a14="http://schemas.microsoft.com/office/drawing/2010/main">
+        <mc:Choice Requires="a14">
           <p:sp>
             <p:nvSpPr>
               <p:cNvPr id="4" name="TextBox 3">
@@ -14746,6 +14760,7 @@
               </a:bodyPr>
               <a:lstStyle/>
               <a:p>
+                <a:pPr/>
                 <a14:m>
                   <m:oMathPara xmlns:m="http://schemas.openxmlformats.org/officeDocument/2006/math">
                     <m:oMathParaPr>
@@ -14816,7 +14831,7 @@
             </p:txBody>
           </p:sp>
         </mc:Choice>
-        <mc:Fallback>
+        <mc:Fallback xmlns="">
           <p:sp>
             <p:nvSpPr>
               <p:cNvPr id="4" name="TextBox 3">
@@ -15014,8 +15029,8 @@
           </a:p>
         </p:txBody>
       </p:sp>
-      <mc:AlternateContent xmlns:mc="http://schemas.openxmlformats.org/markup-compatibility/2006">
-        <mc:Choice xmlns:a14="http://schemas.microsoft.com/office/drawing/2010/main" Requires="a14">
+      <mc:AlternateContent xmlns:mc="http://schemas.openxmlformats.org/markup-compatibility/2006" xmlns:a14="http://schemas.microsoft.com/office/drawing/2010/main">
+        <mc:Choice Requires="a14">
           <p:sp>
             <p:nvSpPr>
               <p:cNvPr id="8" name="TextBox 7">
@@ -15044,6 +15059,7 @@
               </a:bodyPr>
               <a:lstStyle/>
               <a:p>
+                <a:pPr/>
                 <a14:m>
                   <m:oMathPara xmlns:m="http://schemas.openxmlformats.org/officeDocument/2006/math">
                     <m:oMathParaPr>
@@ -15210,7 +15226,7 @@
             </p:txBody>
           </p:sp>
         </mc:Choice>
-        <mc:Fallback>
+        <mc:Fallback xmlns="">
           <p:sp>
             <p:nvSpPr>
               <p:cNvPr id="8" name="TextBox 7">
@@ -15560,8 +15576,8 @@
           </a:p>
         </p:txBody>
       </p:sp>
-      <mc:AlternateContent xmlns:mc="http://schemas.openxmlformats.org/markup-compatibility/2006">
-        <mc:Choice xmlns:a14="http://schemas.microsoft.com/office/drawing/2010/main" Requires="a14">
+      <mc:AlternateContent xmlns:mc="http://schemas.openxmlformats.org/markup-compatibility/2006" xmlns:a14="http://schemas.microsoft.com/office/drawing/2010/main">
+        <mc:Choice Requires="a14">
           <p:sp>
             <p:nvSpPr>
               <p:cNvPr id="3" name="TextBox 2">
@@ -15590,6 +15606,7 @@
               </a:bodyPr>
               <a:lstStyle/>
               <a:p>
+                <a:pPr/>
                 <a14:m>
                   <m:oMathPara xmlns:m="http://schemas.openxmlformats.org/officeDocument/2006/math">
                     <m:oMathParaPr>
@@ -15829,7 +15846,7 @@
             </p:txBody>
           </p:sp>
         </mc:Choice>
-        <mc:Fallback>
+        <mc:Fallback xmlns="">
           <p:sp>
             <p:nvSpPr>
               <p:cNvPr id="3" name="TextBox 2">
@@ -15932,8 +15949,8 @@
           </a:p>
         </p:txBody>
       </p:sp>
-      <mc:AlternateContent xmlns:mc="http://schemas.openxmlformats.org/markup-compatibility/2006">
-        <mc:Choice xmlns:a14="http://schemas.microsoft.com/office/drawing/2010/main" Requires="a14">
+      <mc:AlternateContent xmlns:mc="http://schemas.openxmlformats.org/markup-compatibility/2006" xmlns:a14="http://schemas.microsoft.com/office/drawing/2010/main">
+        <mc:Choice Requires="a14">
           <p:sp>
             <p:nvSpPr>
               <p:cNvPr id="4" name="TextBox 3">
@@ -15975,6 +15992,7 @@
               </a:bodyPr>
               <a:lstStyle/>
               <a:p>
+                <a:pPr/>
                 <a14:m>
                   <m:oMathPara xmlns:m="http://schemas.openxmlformats.org/officeDocument/2006/math">
                     <m:oMathParaPr>
@@ -16045,7 +16063,7 @@
             </p:txBody>
           </p:sp>
         </mc:Choice>
-        <mc:Fallback>
+        <mc:Fallback xmlns="">
           <p:sp>
             <p:nvSpPr>
               <p:cNvPr id="4" name="TextBox 3">
@@ -16243,8 +16261,8 @@
           </a:p>
         </p:txBody>
       </p:sp>
-      <mc:AlternateContent xmlns:mc="http://schemas.openxmlformats.org/markup-compatibility/2006">
-        <mc:Choice xmlns:a14="http://schemas.microsoft.com/office/drawing/2010/main" Requires="a14">
+      <mc:AlternateContent xmlns:mc="http://schemas.openxmlformats.org/markup-compatibility/2006" xmlns:a14="http://schemas.microsoft.com/office/drawing/2010/main">
+        <mc:Choice Requires="a14">
           <p:sp>
             <p:nvSpPr>
               <p:cNvPr id="8" name="TextBox 7">
@@ -16273,6 +16291,7 @@
               </a:bodyPr>
               <a:lstStyle/>
               <a:p>
+                <a:pPr/>
                 <a14:m>
                   <m:oMathPara xmlns:m="http://schemas.openxmlformats.org/officeDocument/2006/math">
                     <m:oMathParaPr>
@@ -16439,7 +16458,7 @@
             </p:txBody>
           </p:sp>
         </mc:Choice>
-        <mc:Fallback>
+        <mc:Fallback xmlns="">
           <p:sp>
             <p:nvSpPr>
               <p:cNvPr id="8" name="TextBox 7">
@@ -16789,8 +16808,8 @@
           </a:p>
         </p:txBody>
       </p:sp>
-      <mc:AlternateContent xmlns:mc="http://schemas.openxmlformats.org/markup-compatibility/2006">
-        <mc:Choice xmlns:a14="http://schemas.microsoft.com/office/drawing/2010/main" Requires="a14">
+      <mc:AlternateContent xmlns:mc="http://schemas.openxmlformats.org/markup-compatibility/2006" xmlns:a14="http://schemas.microsoft.com/office/drawing/2010/main">
+        <mc:Choice Requires="a14">
           <p:sp>
             <p:nvSpPr>
               <p:cNvPr id="3" name="TextBox 2">
@@ -16819,6 +16838,7 @@
               </a:bodyPr>
               <a:lstStyle/>
               <a:p>
+                <a:pPr/>
                 <a14:m>
                   <m:oMathPara xmlns:m="http://schemas.openxmlformats.org/officeDocument/2006/math">
                     <m:oMathParaPr>
@@ -17056,7 +17076,7 @@
             </p:txBody>
           </p:sp>
         </mc:Choice>
-        <mc:Fallback>
+        <mc:Fallback xmlns="">
           <p:sp>
             <p:nvSpPr>
               <p:cNvPr id="3" name="TextBox 2">
@@ -17159,8 +17179,8 @@
           </a:p>
         </p:txBody>
       </p:sp>
-      <mc:AlternateContent xmlns:mc="http://schemas.openxmlformats.org/markup-compatibility/2006">
-        <mc:Choice xmlns:a14="http://schemas.microsoft.com/office/drawing/2010/main" Requires="a14">
+      <mc:AlternateContent xmlns:mc="http://schemas.openxmlformats.org/markup-compatibility/2006" xmlns:a14="http://schemas.microsoft.com/office/drawing/2010/main">
+        <mc:Choice Requires="a14">
           <p:sp>
             <p:nvSpPr>
               <p:cNvPr id="4" name="TextBox 3">
@@ -17202,6 +17222,7 @@
               </a:bodyPr>
               <a:lstStyle/>
               <a:p>
+                <a:pPr/>
                 <a14:m>
                   <m:oMathPara xmlns:m="http://schemas.openxmlformats.org/officeDocument/2006/math">
                     <m:oMathParaPr>
@@ -17272,7 +17293,7 @@
             </p:txBody>
           </p:sp>
         </mc:Choice>
-        <mc:Fallback>
+        <mc:Fallback xmlns="">
           <p:sp>
             <p:nvSpPr>
               <p:cNvPr id="4" name="TextBox 3">
@@ -17470,8 +17491,8 @@
           </a:p>
         </p:txBody>
       </p:sp>
-      <mc:AlternateContent xmlns:mc="http://schemas.openxmlformats.org/markup-compatibility/2006">
-        <mc:Choice xmlns:a14="http://schemas.microsoft.com/office/drawing/2010/main" Requires="a14">
+      <mc:AlternateContent xmlns:mc="http://schemas.openxmlformats.org/markup-compatibility/2006" xmlns:a14="http://schemas.microsoft.com/office/drawing/2010/main">
+        <mc:Choice Requires="a14">
           <p:sp>
             <p:nvSpPr>
               <p:cNvPr id="8" name="TextBox 7">
@@ -17500,6 +17521,7 @@
               </a:bodyPr>
               <a:lstStyle/>
               <a:p>
+                <a:pPr/>
                 <a14:m>
                   <m:oMathPara xmlns:m="http://schemas.openxmlformats.org/officeDocument/2006/math">
                     <m:oMathParaPr>
@@ -17666,7 +17688,7 @@
             </p:txBody>
           </p:sp>
         </mc:Choice>
-        <mc:Fallback>
+        <mc:Fallback xmlns="">
           <p:sp>
             <p:nvSpPr>
               <p:cNvPr id="8" name="TextBox 7">
@@ -18016,8 +18038,8 @@
           </a:p>
         </p:txBody>
       </p:sp>
-      <mc:AlternateContent xmlns:mc="http://schemas.openxmlformats.org/markup-compatibility/2006">
-        <mc:Choice xmlns:a14="http://schemas.microsoft.com/office/drawing/2010/main" Requires="a14">
+      <mc:AlternateContent xmlns:mc="http://schemas.openxmlformats.org/markup-compatibility/2006" xmlns:a14="http://schemas.microsoft.com/office/drawing/2010/main">
+        <mc:Choice Requires="a14">
           <p:sp>
             <p:nvSpPr>
               <p:cNvPr id="3" name="TextBox 2">
@@ -18046,6 +18068,7 @@
               </a:bodyPr>
               <a:lstStyle/>
               <a:p>
+                <a:pPr/>
                 <a14:m>
                   <m:oMathPara xmlns:m="http://schemas.openxmlformats.org/officeDocument/2006/math">
                     <m:oMathParaPr>
@@ -18442,7 +18465,7 @@
             </p:txBody>
           </p:sp>
         </mc:Choice>
-        <mc:Fallback>
+        <mc:Fallback xmlns="">
           <p:sp>
             <p:nvSpPr>
               <p:cNvPr id="3" name="TextBox 2">
@@ -18545,8 +18568,8 @@
           </a:p>
         </p:txBody>
       </p:sp>
-      <mc:AlternateContent xmlns:mc="http://schemas.openxmlformats.org/markup-compatibility/2006">
-        <mc:Choice xmlns:a14="http://schemas.microsoft.com/office/drawing/2010/main" Requires="a14">
+      <mc:AlternateContent xmlns:mc="http://schemas.openxmlformats.org/markup-compatibility/2006" xmlns:a14="http://schemas.microsoft.com/office/drawing/2010/main">
+        <mc:Choice Requires="a14">
           <p:sp>
             <p:nvSpPr>
               <p:cNvPr id="4" name="TextBox 3">
@@ -18588,6 +18611,7 @@
               </a:bodyPr>
               <a:lstStyle/>
               <a:p>
+                <a:pPr/>
                 <a14:m>
                   <m:oMathPara xmlns:m="http://schemas.openxmlformats.org/officeDocument/2006/math">
                     <m:oMathParaPr>
@@ -18658,7 +18682,7 @@
             </p:txBody>
           </p:sp>
         </mc:Choice>
-        <mc:Fallback>
+        <mc:Fallback xmlns="">
           <p:sp>
             <p:nvSpPr>
               <p:cNvPr id="4" name="TextBox 3">
@@ -18856,8 +18880,8 @@
           </a:p>
         </p:txBody>
       </p:sp>
-      <mc:AlternateContent xmlns:mc="http://schemas.openxmlformats.org/markup-compatibility/2006">
-        <mc:Choice xmlns:a14="http://schemas.microsoft.com/office/drawing/2010/main" Requires="a14">
+      <mc:AlternateContent xmlns:mc="http://schemas.openxmlformats.org/markup-compatibility/2006" xmlns:a14="http://schemas.microsoft.com/office/drawing/2010/main">
+        <mc:Choice Requires="a14">
           <p:sp>
             <p:nvSpPr>
               <p:cNvPr id="8" name="TextBox 7">
@@ -18886,6 +18910,7 @@
               </a:bodyPr>
               <a:lstStyle/>
               <a:p>
+                <a:pPr/>
                 <a14:m>
                   <m:oMathPara xmlns:m="http://schemas.openxmlformats.org/officeDocument/2006/math">
                     <m:oMathParaPr>
@@ -19052,7 +19077,7 @@
             </p:txBody>
           </p:sp>
         </mc:Choice>
-        <mc:Fallback>
+        <mc:Fallback xmlns="">
           <p:sp>
             <p:nvSpPr>
               <p:cNvPr id="8" name="TextBox 7">
@@ -19402,8 +19427,8 @@
           </a:p>
         </p:txBody>
       </p:sp>
-      <mc:AlternateContent xmlns:mc="http://schemas.openxmlformats.org/markup-compatibility/2006">
-        <mc:Choice xmlns:a14="http://schemas.microsoft.com/office/drawing/2010/main" Requires="a14">
+      <mc:AlternateContent xmlns:mc="http://schemas.openxmlformats.org/markup-compatibility/2006" xmlns:a14="http://schemas.microsoft.com/office/drawing/2010/main">
+        <mc:Choice Requires="a14">
           <p:sp>
             <p:nvSpPr>
               <p:cNvPr id="3" name="TextBox 2">
@@ -19432,6 +19457,7 @@
               </a:bodyPr>
               <a:lstStyle/>
               <a:p>
+                <a:pPr/>
                 <a14:m>
                   <m:oMathPara xmlns:m="http://schemas.openxmlformats.org/officeDocument/2006/math">
                     <m:oMathParaPr>
@@ -19899,7 +19925,7 @@
             </p:txBody>
           </p:sp>
         </mc:Choice>
-        <mc:Fallback>
+        <mc:Fallback xmlns="">
           <p:sp>
             <p:nvSpPr>
               <p:cNvPr id="3" name="TextBox 2">
@@ -20002,8 +20028,8 @@
           </a:p>
         </p:txBody>
       </p:sp>
-      <mc:AlternateContent xmlns:mc="http://schemas.openxmlformats.org/markup-compatibility/2006">
-        <mc:Choice xmlns:a14="http://schemas.microsoft.com/office/drawing/2010/main" Requires="a14">
+      <mc:AlternateContent xmlns:mc="http://schemas.openxmlformats.org/markup-compatibility/2006" xmlns:a14="http://schemas.microsoft.com/office/drawing/2010/main">
+        <mc:Choice Requires="a14">
           <p:sp>
             <p:nvSpPr>
               <p:cNvPr id="4" name="TextBox 3">
@@ -20045,6 +20071,7 @@
               </a:bodyPr>
               <a:lstStyle/>
               <a:p>
+                <a:pPr/>
                 <a14:m>
                   <m:oMathPara xmlns:m="http://schemas.openxmlformats.org/officeDocument/2006/math">
                     <m:oMathParaPr>
@@ -20115,7 +20142,7 @@
             </p:txBody>
           </p:sp>
         </mc:Choice>
-        <mc:Fallback>
+        <mc:Fallback xmlns="">
           <p:sp>
             <p:nvSpPr>
               <p:cNvPr id="4" name="TextBox 3">
@@ -20313,8 +20340,8 @@
           </a:p>
         </p:txBody>
       </p:sp>
-      <mc:AlternateContent xmlns:mc="http://schemas.openxmlformats.org/markup-compatibility/2006">
-        <mc:Choice xmlns:a14="http://schemas.microsoft.com/office/drawing/2010/main" Requires="a14">
+      <mc:AlternateContent xmlns:mc="http://schemas.openxmlformats.org/markup-compatibility/2006" xmlns:a14="http://schemas.microsoft.com/office/drawing/2010/main">
+        <mc:Choice Requires="a14">
           <p:sp>
             <p:nvSpPr>
               <p:cNvPr id="8" name="TextBox 7">
@@ -20343,6 +20370,7 @@
               </a:bodyPr>
               <a:lstStyle/>
               <a:p>
+                <a:pPr/>
                 <a14:m>
                   <m:oMathPara xmlns:m="http://schemas.openxmlformats.org/officeDocument/2006/math">
                     <m:oMathParaPr>
@@ -20509,7 +20537,7 @@
             </p:txBody>
           </p:sp>
         </mc:Choice>
-        <mc:Fallback>
+        <mc:Fallback xmlns="">
           <p:sp>
             <p:nvSpPr>
               <p:cNvPr id="8" name="TextBox 7">
@@ -20859,8 +20887,8 @@
           </a:p>
         </p:txBody>
       </p:sp>
-      <mc:AlternateContent xmlns:mc="http://schemas.openxmlformats.org/markup-compatibility/2006">
-        <mc:Choice xmlns:a14="http://schemas.microsoft.com/office/drawing/2010/main" Requires="a14">
+      <mc:AlternateContent xmlns:mc="http://schemas.openxmlformats.org/markup-compatibility/2006" xmlns:a14="http://schemas.microsoft.com/office/drawing/2010/main">
+        <mc:Choice Requires="a14">
           <p:sp>
             <p:nvSpPr>
               <p:cNvPr id="3" name="TextBox 2">
@@ -20889,6 +20917,7 @@
               </a:bodyPr>
               <a:lstStyle/>
               <a:p>
+                <a:pPr/>
                 <a14:m>
                   <m:oMathPara xmlns:m="http://schemas.openxmlformats.org/officeDocument/2006/math">
                     <m:oMathParaPr>
@@ -21284,7 +21313,7 @@
             </p:txBody>
           </p:sp>
         </mc:Choice>
-        <mc:Fallback>
+        <mc:Fallback xmlns="">
           <p:sp>
             <p:nvSpPr>
               <p:cNvPr id="3" name="TextBox 2">
@@ -21387,8 +21416,8 @@
           </a:p>
         </p:txBody>
       </p:sp>
-      <mc:AlternateContent xmlns:mc="http://schemas.openxmlformats.org/markup-compatibility/2006">
-        <mc:Choice xmlns:a14="http://schemas.microsoft.com/office/drawing/2010/main" Requires="a14">
+      <mc:AlternateContent xmlns:mc="http://schemas.openxmlformats.org/markup-compatibility/2006" xmlns:a14="http://schemas.microsoft.com/office/drawing/2010/main">
+        <mc:Choice Requires="a14">
           <p:sp>
             <p:nvSpPr>
               <p:cNvPr id="4" name="TextBox 3">
@@ -21430,6 +21459,7 @@
               </a:bodyPr>
               <a:lstStyle/>
               <a:p>
+                <a:pPr/>
                 <a14:m>
                   <m:oMathPara xmlns:m="http://schemas.openxmlformats.org/officeDocument/2006/math">
                     <m:oMathParaPr>
@@ -21500,7 +21530,7 @@
             </p:txBody>
           </p:sp>
         </mc:Choice>
-        <mc:Fallback>
+        <mc:Fallback xmlns="">
           <p:sp>
             <p:nvSpPr>
               <p:cNvPr id="4" name="TextBox 3">
@@ -21698,8 +21728,8 @@
           </a:p>
         </p:txBody>
       </p:sp>
-      <mc:AlternateContent xmlns:mc="http://schemas.openxmlformats.org/markup-compatibility/2006">
-        <mc:Choice xmlns:a14="http://schemas.microsoft.com/office/drawing/2010/main" Requires="a14">
+      <mc:AlternateContent xmlns:mc="http://schemas.openxmlformats.org/markup-compatibility/2006" xmlns:a14="http://schemas.microsoft.com/office/drawing/2010/main">
+        <mc:Choice Requires="a14">
           <p:sp>
             <p:nvSpPr>
               <p:cNvPr id="8" name="TextBox 7">
@@ -21728,6 +21758,7 @@
               </a:bodyPr>
               <a:lstStyle/>
               <a:p>
+                <a:pPr/>
                 <a14:m>
                   <m:oMathPara xmlns:m="http://schemas.openxmlformats.org/officeDocument/2006/math">
                     <m:oMathParaPr>
@@ -21894,7 +21925,7 @@
             </p:txBody>
           </p:sp>
         </mc:Choice>
-        <mc:Fallback>
+        <mc:Fallback xmlns="">
           <p:sp>
             <p:nvSpPr>
               <p:cNvPr id="8" name="TextBox 7">
@@ -22244,8 +22275,8 @@
           </a:p>
         </p:txBody>
       </p:sp>
-      <mc:AlternateContent xmlns:mc="http://schemas.openxmlformats.org/markup-compatibility/2006">
-        <mc:Choice xmlns:a14="http://schemas.microsoft.com/office/drawing/2010/main" Requires="a14">
+      <mc:AlternateContent xmlns:mc="http://schemas.openxmlformats.org/markup-compatibility/2006" xmlns:a14="http://schemas.microsoft.com/office/drawing/2010/main">
+        <mc:Choice Requires="a14">
           <p:sp>
             <p:nvSpPr>
               <p:cNvPr id="3" name="TextBox 2">
@@ -22274,6 +22305,7 @@
               </a:bodyPr>
               <a:lstStyle/>
               <a:p>
+                <a:pPr/>
                 <a14:m>
                   <m:oMathPara xmlns:m="http://schemas.openxmlformats.org/officeDocument/2006/math">
                     <m:oMathParaPr>
@@ -22468,13 +22500,7 @@
                         <a:rPr lang="en-US" b="0" i="1" smtClean="0">
                           <a:latin typeface="Cambria Math" panose="02040503050406030204" pitchFamily="18" charset="0"/>
                         </a:rPr>
-                        <m:t>=0 </m:t>
-                      </m:r>
-                      <m:r>
-                        <a:rPr lang="en-US" b="0" i="1" smtClean="0">
-                          <a:latin typeface="Cambria Math" panose="02040503050406030204" pitchFamily="18" charset="0"/>
-                        </a:rPr>
-                        <m:t>∀</m:t>
+                        <m:t>=0 ∀</m:t>
                       </m:r>
                       <m:r>
                         <a:rPr lang="en-US" b="0" i="1" smtClean="0">
@@ -22558,7 +22584,7 @@
             </p:txBody>
           </p:sp>
         </mc:Choice>
-        <mc:Fallback>
+        <mc:Fallback xmlns="">
           <p:sp>
             <p:nvSpPr>
               <p:cNvPr id="3" name="TextBox 2">
@@ -22661,8 +22687,8 @@
           </a:p>
         </p:txBody>
       </p:sp>
-      <mc:AlternateContent xmlns:mc="http://schemas.openxmlformats.org/markup-compatibility/2006">
-        <mc:Choice xmlns:a14="http://schemas.microsoft.com/office/drawing/2010/main" Requires="a14">
+      <mc:AlternateContent xmlns:mc="http://schemas.openxmlformats.org/markup-compatibility/2006" xmlns:a14="http://schemas.microsoft.com/office/drawing/2010/main">
+        <mc:Choice Requires="a14">
           <p:sp>
             <p:nvSpPr>
               <p:cNvPr id="4" name="TextBox 3">
@@ -22704,6 +22730,7 @@
               </a:bodyPr>
               <a:lstStyle/>
               <a:p>
+                <a:pPr/>
                 <a14:m>
                   <m:oMathPara xmlns:m="http://schemas.openxmlformats.org/officeDocument/2006/math">
                     <m:oMathParaPr>
@@ -22774,7 +22801,7 @@
             </p:txBody>
           </p:sp>
         </mc:Choice>
-        <mc:Fallback>
+        <mc:Fallback xmlns="">
           <p:sp>
             <p:nvSpPr>
               <p:cNvPr id="4" name="TextBox 3">
@@ -22972,8 +22999,8 @@
           </a:p>
         </p:txBody>
       </p:sp>
-      <mc:AlternateContent xmlns:mc="http://schemas.openxmlformats.org/markup-compatibility/2006">
-        <mc:Choice xmlns:a14="http://schemas.microsoft.com/office/drawing/2010/main" Requires="a14">
+      <mc:AlternateContent xmlns:mc="http://schemas.openxmlformats.org/markup-compatibility/2006" xmlns:a14="http://schemas.microsoft.com/office/drawing/2010/main">
+        <mc:Choice Requires="a14">
           <p:sp>
             <p:nvSpPr>
               <p:cNvPr id="8" name="TextBox 7">
@@ -23002,6 +23029,7 @@
               </a:bodyPr>
               <a:lstStyle/>
               <a:p>
+                <a:pPr/>
                 <a14:m>
                   <m:oMathPara xmlns:m="http://schemas.openxmlformats.org/officeDocument/2006/math">
                     <m:oMathParaPr>
@@ -23168,7 +23196,7 @@
             </p:txBody>
           </p:sp>
         </mc:Choice>
-        <mc:Fallback>
+        <mc:Fallback xmlns="">
           <p:sp>
             <p:nvSpPr>
               <p:cNvPr id="8" name="TextBox 7">
@@ -23518,8 +23546,8 @@
           </a:p>
         </p:txBody>
       </p:sp>
-      <mc:AlternateContent xmlns:mc="http://schemas.openxmlformats.org/markup-compatibility/2006">
-        <mc:Choice xmlns:a14="http://schemas.microsoft.com/office/drawing/2010/main" Requires="a14">
+      <mc:AlternateContent xmlns:mc="http://schemas.openxmlformats.org/markup-compatibility/2006" xmlns:a14="http://schemas.microsoft.com/office/drawing/2010/main">
+        <mc:Choice Requires="a14">
           <p:sp>
             <p:nvSpPr>
               <p:cNvPr id="3" name="TextBox 2">
@@ -23548,6 +23576,7 @@
               </a:bodyPr>
               <a:lstStyle/>
               <a:p>
+                <a:pPr/>
                 <a14:m>
                   <m:oMathPara xmlns:m="http://schemas.openxmlformats.org/officeDocument/2006/math">
                     <m:oMathParaPr>
@@ -23825,7 +23854,7 @@
             </p:txBody>
           </p:sp>
         </mc:Choice>
-        <mc:Fallback>
+        <mc:Fallback xmlns="">
           <p:sp>
             <p:nvSpPr>
               <p:cNvPr id="3" name="TextBox 2">
@@ -23928,8 +23957,8 @@
           </a:p>
         </p:txBody>
       </p:sp>
-      <mc:AlternateContent xmlns:mc="http://schemas.openxmlformats.org/markup-compatibility/2006">
-        <mc:Choice xmlns:a14="http://schemas.microsoft.com/office/drawing/2010/main" Requires="a14">
+      <mc:AlternateContent xmlns:mc="http://schemas.openxmlformats.org/markup-compatibility/2006" xmlns:a14="http://schemas.microsoft.com/office/drawing/2010/main">
+        <mc:Choice Requires="a14">
           <p:sp>
             <p:nvSpPr>
               <p:cNvPr id="4" name="TextBox 3">
@@ -23971,6 +24000,7 @@
               </a:bodyPr>
               <a:lstStyle/>
               <a:p>
+                <a:pPr/>
                 <a14:m>
                   <m:oMathPara xmlns:m="http://schemas.openxmlformats.org/officeDocument/2006/math">
                     <m:oMathParaPr>
@@ -24042,7 +24072,7 @@
                       <m:sSub>
                         <m:sSubPr>
                           <m:ctrlPr>
-                            <a:rPr lang="en-US" b="0" i="0" smtClean="0">
+                            <a:rPr lang="en-US" b="0" i="1" smtClean="0">
                               <a:latin typeface="Cambria Math" panose="02040503050406030204" pitchFamily="18" charset="0"/>
                             </a:rPr>
                           </m:ctrlPr>
@@ -24076,7 +24106,7 @@
                       <m:sSub>
                         <m:sSubPr>
                           <m:ctrlPr>
-                            <a:rPr lang="en-US" b="0" i="0" smtClean="0">
+                            <a:rPr lang="en-US" b="0" i="1" smtClean="0">
                               <a:latin typeface="Cambria Math" panose="02040503050406030204" pitchFamily="18" charset="0"/>
                             </a:rPr>
                           </m:ctrlPr>
@@ -24112,7 +24142,7 @@
             </p:txBody>
           </p:sp>
         </mc:Choice>
-        <mc:Fallback>
+        <mc:Fallback xmlns="">
           <p:sp>
             <p:nvSpPr>
               <p:cNvPr id="4" name="TextBox 3">
@@ -24541,8 +24571,8 @@
           </a:p>
         </p:txBody>
       </p:sp>
-      <mc:AlternateContent xmlns:mc="http://schemas.openxmlformats.org/markup-compatibility/2006">
-        <mc:Choice xmlns:a14="http://schemas.microsoft.com/office/drawing/2010/main" Requires="a14">
+      <mc:AlternateContent xmlns:mc="http://schemas.openxmlformats.org/markup-compatibility/2006" xmlns:a14="http://schemas.microsoft.com/office/drawing/2010/main">
+        <mc:Choice Requires="a14">
           <p:sp>
             <p:nvSpPr>
               <p:cNvPr id="3" name="TextBox 2">
@@ -24571,6 +24601,7 @@
               </a:bodyPr>
               <a:lstStyle/>
               <a:p>
+                <a:pPr/>
                 <a14:m>
                   <m:oMathPara xmlns:m="http://schemas.openxmlformats.org/officeDocument/2006/math">
                     <m:oMathParaPr>
@@ -24864,7 +24895,7 @@
             </p:txBody>
           </p:sp>
         </mc:Choice>
-        <mc:Fallback>
+        <mc:Fallback xmlns="">
           <p:sp>
             <p:nvSpPr>
               <p:cNvPr id="3" name="TextBox 2">
@@ -24967,8 +24998,8 @@
           </a:p>
         </p:txBody>
       </p:sp>
-      <mc:AlternateContent xmlns:mc="http://schemas.openxmlformats.org/markup-compatibility/2006">
-        <mc:Choice xmlns:a14="http://schemas.microsoft.com/office/drawing/2010/main" Requires="a14">
+      <mc:AlternateContent xmlns:mc="http://schemas.openxmlformats.org/markup-compatibility/2006" xmlns:a14="http://schemas.microsoft.com/office/drawing/2010/main">
+        <mc:Choice Requires="a14">
           <p:sp>
             <p:nvSpPr>
               <p:cNvPr id="3" name="Content Placeholder 2">
@@ -25437,7 +25468,7 @@
             </p:txBody>
           </p:sp>
         </mc:Choice>
-        <mc:Fallback>
+        <mc:Fallback xmlns="">
           <p:sp>
             <p:nvSpPr>
               <p:cNvPr id="3" name="Content Placeholder 2">
@@ -25624,8 +25655,8 @@
           </a:p>
         </p:txBody>
       </p:sp>
-      <mc:AlternateContent xmlns:mc="http://schemas.openxmlformats.org/markup-compatibility/2006">
-        <mc:Choice xmlns:a14="http://schemas.microsoft.com/office/drawing/2010/main" Requires="a14">
+      <mc:AlternateContent xmlns:mc="http://schemas.openxmlformats.org/markup-compatibility/2006" xmlns:a14="http://schemas.microsoft.com/office/drawing/2010/main">
+        <mc:Choice Requires="a14">
           <p:sp>
             <p:nvSpPr>
               <p:cNvPr id="3" name="Content Placeholder 2">
@@ -25952,7 +25983,7 @@
             </p:txBody>
           </p:sp>
         </mc:Choice>
-        <mc:Fallback>
+        <mc:Fallback xmlns="">
           <p:sp>
             <p:nvSpPr>
               <p:cNvPr id="3" name="Content Placeholder 2">
@@ -28614,8 +28645,8 @@
           </a:p>
         </p:txBody>
       </p:sp>
-      <mc:AlternateContent xmlns:mc="http://schemas.openxmlformats.org/markup-compatibility/2006">
-        <mc:Choice xmlns:a14="http://schemas.microsoft.com/office/drawing/2010/main" Requires="a14">
+      <mc:AlternateContent xmlns:mc="http://schemas.openxmlformats.org/markup-compatibility/2006" xmlns:a14="http://schemas.microsoft.com/office/drawing/2010/main">
+        <mc:Choice Requires="a14">
           <p:sp>
             <p:nvSpPr>
               <p:cNvPr id="7" name="TextBox 6">
@@ -28644,6 +28675,7 @@
               </a:bodyPr>
               <a:lstStyle/>
               <a:p>
+                <a:pPr/>
                 <a14:m>
                   <m:oMathPara xmlns:m="http://schemas.openxmlformats.org/officeDocument/2006/math">
                     <m:oMathParaPr>
@@ -28798,7 +28830,7 @@
             </p:txBody>
           </p:sp>
         </mc:Choice>
-        <mc:Fallback>
+        <mc:Fallback xmlns="">
           <p:sp>
             <p:nvSpPr>
               <p:cNvPr id="7" name="TextBox 6">
@@ -28843,8 +28875,8 @@
           </p:sp>
         </mc:Fallback>
       </mc:AlternateContent>
-      <mc:AlternateContent xmlns:mc="http://schemas.openxmlformats.org/markup-compatibility/2006">
-        <mc:Choice xmlns:a14="http://schemas.microsoft.com/office/drawing/2010/main" Requires="a14">
+      <mc:AlternateContent xmlns:mc="http://schemas.openxmlformats.org/markup-compatibility/2006" xmlns:a14="http://schemas.microsoft.com/office/drawing/2010/main">
+        <mc:Choice Requires="a14">
           <p:sp>
             <p:nvSpPr>
               <p:cNvPr id="8" name="TextBox 7">
@@ -28873,6 +28905,7 @@
               </a:bodyPr>
               <a:lstStyle/>
               <a:p>
+                <a:pPr/>
                 <a14:m>
                   <m:oMathPara xmlns:m="http://schemas.openxmlformats.org/officeDocument/2006/math">
                     <m:oMathParaPr>
@@ -29027,7 +29060,7 @@
             </p:txBody>
           </p:sp>
         </mc:Choice>
-        <mc:Fallback>
+        <mc:Fallback xmlns="">
           <p:sp>
             <p:nvSpPr>
               <p:cNvPr id="8" name="TextBox 7">

</xml_diff>